<commit_message>
primera parte de presentacion sobre precios
</commit_message>
<xml_diff>
--- a/presentación.pptx
+++ b/presentación.pptx
@@ -7,6 +7,11 @@
   <p:sldIdLst>
     <p:sldId id="256" r:id="rId2"/>
     <p:sldId id="257" r:id="rId3"/>
+    <p:sldId id="258" r:id="rId4"/>
+    <p:sldId id="259" r:id="rId5"/>
+    <p:sldId id="260" r:id="rId6"/>
+    <p:sldId id="261" r:id="rId7"/>
+    <p:sldId id="262" r:id="rId8"/>
   </p:sldIdLst>
   <p:sldSz cx="12192000" cy="6858000"/>
   <p:notesSz cx="6858000" cy="9144000"/>
@@ -170,7 +175,7 @@
           <a:noFill/>
           <a:extLst>
             <a:ext uri="{909E8E84-426E-40dd-AFC4-6F175D3DCCD1}">
-              <a14:hiddenFill xmlns="" xmlns:a14="http://schemas.microsoft.com/office/drawing/2010/main">
+              <a14:hiddenFill xmlns:a14="http://schemas.microsoft.com/office/drawing/2010/main" xmlns="">
                 <a:solidFill>
                   <a:srgbClr val="FFFFFF"/>
                 </a:solidFill>
@@ -230,7 +235,7 @@
             </a:ln>
             <a:extLst>
               <a:ext uri="{91240B29-F687-4f45-9708-019B960494DF}">
-                <a14:hiddenLine xmlns="" xmlns:a14="http://schemas.microsoft.com/office/drawing/2010/main" w="9525">
+                <a14:hiddenLine xmlns:a14="http://schemas.microsoft.com/office/drawing/2010/main" xmlns="" w="9525">
                   <a:solidFill>
                     <a:srgbClr val="000000"/>
                   </a:solidFill>
@@ -320,7 +325,7 @@
             </a:ln>
             <a:extLst>
               <a:ext uri="{91240B29-F687-4f45-9708-019B960494DF}">
-                <a14:hiddenLine xmlns="" xmlns:a14="http://schemas.microsoft.com/office/drawing/2010/main" w="9525">
+                <a14:hiddenLine xmlns:a14="http://schemas.microsoft.com/office/drawing/2010/main" xmlns="" w="9525">
                   <a:solidFill>
                     <a:srgbClr val="000000"/>
                   </a:solidFill>
@@ -410,7 +415,7 @@
             </a:ln>
             <a:extLst>
               <a:ext uri="{91240B29-F687-4f45-9708-019B960494DF}">
-                <a14:hiddenLine xmlns="" xmlns:a14="http://schemas.microsoft.com/office/drawing/2010/main" w="9525">
+                <a14:hiddenLine xmlns:a14="http://schemas.microsoft.com/office/drawing/2010/main" xmlns="" w="9525">
                   <a:solidFill>
                     <a:srgbClr val="000000"/>
                   </a:solidFill>
@@ -444,7 +449,7 @@
             </a:ln>
             <a:extLst>
               <a:ext uri="{91240B29-F687-4f45-9708-019B960494DF}">
-                <a14:hiddenLine xmlns="" xmlns:a14="http://schemas.microsoft.com/office/drawing/2010/main" w="9525">
+                <a14:hiddenLine xmlns:a14="http://schemas.microsoft.com/office/drawing/2010/main" xmlns="" w="9525">
                   <a:solidFill>
                     <a:srgbClr val="000000"/>
                   </a:solidFill>
@@ -534,7 +539,7 @@
             </a:ln>
             <a:extLst>
               <a:ext uri="{91240B29-F687-4f45-9708-019B960494DF}">
-                <a14:hiddenLine xmlns="" xmlns:a14="http://schemas.microsoft.com/office/drawing/2010/main" w="9525">
+                <a14:hiddenLine xmlns:a14="http://schemas.microsoft.com/office/drawing/2010/main" xmlns="" w="9525">
                   <a:solidFill>
                     <a:srgbClr val="000000"/>
                   </a:solidFill>
@@ -596,7 +601,7 @@
             </a:ln>
             <a:extLst>
               <a:ext uri="{91240B29-F687-4f45-9708-019B960494DF}">
-                <a14:hiddenLine xmlns="" xmlns:a14="http://schemas.microsoft.com/office/drawing/2010/main" w="9525">
+                <a14:hiddenLine xmlns:a14="http://schemas.microsoft.com/office/drawing/2010/main" xmlns="" w="9525">
                   <a:solidFill>
                     <a:srgbClr val="000000"/>
                   </a:solidFill>
@@ -658,7 +663,7 @@
             </a:ln>
             <a:extLst>
               <a:ext uri="{91240B29-F687-4f45-9708-019B960494DF}">
-                <a14:hiddenLine xmlns="" xmlns:a14="http://schemas.microsoft.com/office/drawing/2010/main" w="9525">
+                <a14:hiddenLine xmlns:a14="http://schemas.microsoft.com/office/drawing/2010/main" xmlns="" w="9525">
                   <a:solidFill>
                     <a:srgbClr val="000000"/>
                   </a:solidFill>
@@ -748,7 +753,7 @@
             </a:ln>
             <a:extLst>
               <a:ext uri="{91240B29-F687-4f45-9708-019B960494DF}">
-                <a14:hiddenLine xmlns="" xmlns:a14="http://schemas.microsoft.com/office/drawing/2010/main" w="9525">
+                <a14:hiddenLine xmlns:a14="http://schemas.microsoft.com/office/drawing/2010/main" xmlns="" w="9525">
                   <a:solidFill>
                     <a:srgbClr val="000000"/>
                   </a:solidFill>
@@ -810,7 +815,7 @@
             </a:ln>
             <a:extLst>
               <a:ext uri="{91240B29-F687-4f45-9708-019B960494DF}">
-                <a14:hiddenLine xmlns="" xmlns:a14="http://schemas.microsoft.com/office/drawing/2010/main" w="9525">
+                <a14:hiddenLine xmlns:a14="http://schemas.microsoft.com/office/drawing/2010/main" xmlns="" w="9525">
                   <a:solidFill>
                     <a:srgbClr val="000000"/>
                   </a:solidFill>
@@ -872,7 +877,7 @@
             </a:ln>
             <a:extLst>
               <a:ext uri="{91240B29-F687-4f45-9708-019B960494DF}">
-                <a14:hiddenLine xmlns="" xmlns:a14="http://schemas.microsoft.com/office/drawing/2010/main" w="9525">
+                <a14:hiddenLine xmlns:a14="http://schemas.microsoft.com/office/drawing/2010/main" xmlns="" w="9525">
                   <a:solidFill>
                     <a:srgbClr val="000000"/>
                   </a:solidFill>
@@ -962,7 +967,7 @@
             </a:ln>
             <a:extLst>
               <a:ext uri="{91240B29-F687-4f45-9708-019B960494DF}">
-                <a14:hiddenLine xmlns="" xmlns:a14="http://schemas.microsoft.com/office/drawing/2010/main" w="9525">
+                <a14:hiddenLine xmlns:a14="http://schemas.microsoft.com/office/drawing/2010/main" xmlns="" w="9525">
                   <a:solidFill>
                     <a:srgbClr val="000000"/>
                   </a:solidFill>
@@ -1052,7 +1057,7 @@
             </a:ln>
             <a:extLst>
               <a:ext uri="{91240B29-F687-4f45-9708-019B960494DF}">
-                <a14:hiddenLine xmlns="" xmlns:a14="http://schemas.microsoft.com/office/drawing/2010/main" w="9525">
+                <a14:hiddenLine xmlns:a14="http://schemas.microsoft.com/office/drawing/2010/main" xmlns="" w="9525">
                   <a:solidFill>
                     <a:srgbClr val="000000"/>
                   </a:solidFill>
@@ -1114,7 +1119,7 @@
             </a:ln>
             <a:extLst>
               <a:ext uri="{91240B29-F687-4f45-9708-019B960494DF}">
-                <a14:hiddenLine xmlns="" xmlns:a14="http://schemas.microsoft.com/office/drawing/2010/main" w="9525">
+                <a14:hiddenLine xmlns:a14="http://schemas.microsoft.com/office/drawing/2010/main" xmlns="" w="9525">
                   <a:solidFill>
                     <a:srgbClr val="000000"/>
                   </a:solidFill>
@@ -1224,7 +1229,7 @@
             </a:ln>
             <a:extLst>
               <a:ext uri="{91240B29-F687-4f45-9708-019B960494DF}">
-                <a14:hiddenLine xmlns="" xmlns:a14="http://schemas.microsoft.com/office/drawing/2010/main" w="9525">
+                <a14:hiddenLine xmlns:a14="http://schemas.microsoft.com/office/drawing/2010/main" xmlns="" w="9525">
                   <a:solidFill>
                     <a:srgbClr val="000000"/>
                   </a:solidFill>
@@ -1286,7 +1291,7 @@
             </a:ln>
             <a:extLst>
               <a:ext uri="{91240B29-F687-4f45-9708-019B960494DF}">
-                <a14:hiddenLine xmlns="" xmlns:a14="http://schemas.microsoft.com/office/drawing/2010/main" w="9525">
+                <a14:hiddenLine xmlns:a14="http://schemas.microsoft.com/office/drawing/2010/main" xmlns="" w="9525">
                   <a:solidFill>
                     <a:srgbClr val="000000"/>
                   </a:solidFill>
@@ -1376,7 +1381,7 @@
             </a:ln>
             <a:extLst>
               <a:ext uri="{91240B29-F687-4f45-9708-019B960494DF}">
-                <a14:hiddenLine xmlns="" xmlns:a14="http://schemas.microsoft.com/office/drawing/2010/main" w="9525">
+                <a14:hiddenLine xmlns:a14="http://schemas.microsoft.com/office/drawing/2010/main" xmlns="" w="9525">
                   <a:solidFill>
                     <a:srgbClr val="000000"/>
                   </a:solidFill>
@@ -1466,7 +1471,7 @@
             </a:ln>
             <a:extLst>
               <a:ext uri="{91240B29-F687-4f45-9708-019B960494DF}">
-                <a14:hiddenLine xmlns="" xmlns:a14="http://schemas.microsoft.com/office/drawing/2010/main" w="9525">
+                <a14:hiddenLine xmlns:a14="http://schemas.microsoft.com/office/drawing/2010/main" xmlns="" w="9525">
                   <a:solidFill>
                     <a:srgbClr val="000000"/>
                   </a:solidFill>
@@ -1528,7 +1533,7 @@
             </a:ln>
             <a:extLst>
               <a:ext uri="{91240B29-F687-4f45-9708-019B960494DF}">
-                <a14:hiddenLine xmlns="" xmlns:a14="http://schemas.microsoft.com/office/drawing/2010/main" w="9525">
+                <a14:hiddenLine xmlns:a14="http://schemas.microsoft.com/office/drawing/2010/main" xmlns="" w="9525">
                   <a:solidFill>
                     <a:srgbClr val="000000"/>
                   </a:solidFill>
@@ -1618,7 +1623,7 @@
             </a:ln>
             <a:extLst>
               <a:ext uri="{91240B29-F687-4f45-9708-019B960494DF}">
-                <a14:hiddenLine xmlns="" xmlns:a14="http://schemas.microsoft.com/office/drawing/2010/main" w="9525">
+                <a14:hiddenLine xmlns:a14="http://schemas.microsoft.com/office/drawing/2010/main" xmlns="" w="9525">
                   <a:solidFill>
                     <a:srgbClr val="000000"/>
                   </a:solidFill>
@@ -1708,7 +1713,7 @@
             </a:ln>
             <a:extLst>
               <a:ext uri="{91240B29-F687-4f45-9708-019B960494DF}">
-                <a14:hiddenLine xmlns="" xmlns:a14="http://schemas.microsoft.com/office/drawing/2010/main" w="9525">
+                <a14:hiddenLine xmlns:a14="http://schemas.microsoft.com/office/drawing/2010/main" xmlns="" w="9525">
                   <a:solidFill>
                     <a:srgbClr val="000000"/>
                   </a:solidFill>
@@ -1764,7 +1769,7 @@
             </a:ln>
             <a:extLst>
               <a:ext uri="{91240B29-F687-4f45-9708-019B960494DF}">
-                <a14:hiddenLine xmlns="" xmlns:a14="http://schemas.microsoft.com/office/drawing/2010/main" w="9525">
+                <a14:hiddenLine xmlns:a14="http://schemas.microsoft.com/office/drawing/2010/main" xmlns="" w="9525">
                   <a:solidFill>
                     <a:srgbClr val="000000"/>
                   </a:solidFill>
@@ -1854,7 +1859,7 @@
             </a:ln>
             <a:extLst>
               <a:ext uri="{91240B29-F687-4f45-9708-019B960494DF}">
-                <a14:hiddenLine xmlns="" xmlns:a14="http://schemas.microsoft.com/office/drawing/2010/main" w="9525">
+                <a14:hiddenLine xmlns:a14="http://schemas.microsoft.com/office/drawing/2010/main" xmlns="" w="9525">
                   <a:solidFill>
                     <a:srgbClr val="000000"/>
                   </a:solidFill>
@@ -1910,7 +1915,7 @@
             </a:ln>
             <a:extLst>
               <a:ext uri="{91240B29-F687-4f45-9708-019B960494DF}">
-                <a14:hiddenLine xmlns="" xmlns:a14="http://schemas.microsoft.com/office/drawing/2010/main" w="9525">
+                <a14:hiddenLine xmlns:a14="http://schemas.microsoft.com/office/drawing/2010/main" xmlns="" w="9525">
                   <a:solidFill>
                     <a:srgbClr val="000000"/>
                   </a:solidFill>
@@ -2000,7 +2005,7 @@
             </a:ln>
             <a:extLst>
               <a:ext uri="{91240B29-F687-4f45-9708-019B960494DF}">
-                <a14:hiddenLine xmlns="" xmlns:a14="http://schemas.microsoft.com/office/drawing/2010/main" w="9525">
+                <a14:hiddenLine xmlns:a14="http://schemas.microsoft.com/office/drawing/2010/main" xmlns="" w="9525">
                   <a:solidFill>
                     <a:srgbClr val="000000"/>
                   </a:solidFill>
@@ -2068,7 +2073,7 @@
             </a:ln>
             <a:extLst>
               <a:ext uri="{91240B29-F687-4f45-9708-019B960494DF}">
-                <a14:hiddenLine xmlns="" xmlns:a14="http://schemas.microsoft.com/office/drawing/2010/main" w="9525">
+                <a14:hiddenLine xmlns:a14="http://schemas.microsoft.com/office/drawing/2010/main" xmlns="" w="9525">
                   <a:solidFill>
                     <a:srgbClr val="000000"/>
                   </a:solidFill>
@@ -2158,7 +2163,7 @@
             </a:ln>
             <a:extLst>
               <a:ext uri="{91240B29-F687-4f45-9708-019B960494DF}">
-                <a14:hiddenLine xmlns="" xmlns:a14="http://schemas.microsoft.com/office/drawing/2010/main" w="9525">
+                <a14:hiddenLine xmlns:a14="http://schemas.microsoft.com/office/drawing/2010/main" xmlns="" w="9525">
                   <a:solidFill>
                     <a:srgbClr val="000000"/>
                   </a:solidFill>
@@ -2226,7 +2231,7 @@
             </a:ln>
             <a:extLst>
               <a:ext uri="{91240B29-F687-4f45-9708-019B960494DF}">
-                <a14:hiddenLine xmlns="" xmlns:a14="http://schemas.microsoft.com/office/drawing/2010/main" w="9525">
+                <a14:hiddenLine xmlns:a14="http://schemas.microsoft.com/office/drawing/2010/main" xmlns="" w="9525">
                   <a:solidFill>
                     <a:srgbClr val="000000"/>
                   </a:solidFill>
@@ -2316,7 +2321,7 @@
             </a:ln>
             <a:extLst>
               <a:ext uri="{91240B29-F687-4f45-9708-019B960494DF}">
-                <a14:hiddenLine xmlns="" xmlns:a14="http://schemas.microsoft.com/office/drawing/2010/main" w="9525">
+                <a14:hiddenLine xmlns:a14="http://schemas.microsoft.com/office/drawing/2010/main" xmlns="" w="9525">
                   <a:solidFill>
                     <a:srgbClr val="000000"/>
                   </a:solidFill>
@@ -2350,7 +2355,7 @@
             </a:ln>
             <a:extLst>
               <a:ext uri="{91240B29-F687-4f45-9708-019B960494DF}">
-                <a14:hiddenLine xmlns="" xmlns:a14="http://schemas.microsoft.com/office/drawing/2010/main" w="9525">
+                <a14:hiddenLine xmlns:a14="http://schemas.microsoft.com/office/drawing/2010/main" xmlns="" w="9525">
                   <a:solidFill>
                     <a:srgbClr val="000000"/>
                   </a:solidFill>
@@ -2440,7 +2445,7 @@
             </a:ln>
             <a:extLst>
               <a:ext uri="{91240B29-F687-4f45-9708-019B960494DF}">
-                <a14:hiddenLine xmlns="" xmlns:a14="http://schemas.microsoft.com/office/drawing/2010/main" w="9525">
+                <a14:hiddenLine xmlns:a14="http://schemas.microsoft.com/office/drawing/2010/main" xmlns="" w="9525">
                   <a:solidFill>
                     <a:srgbClr val="000000"/>
                   </a:solidFill>
@@ -2502,7 +2507,7 @@
             </a:ln>
             <a:extLst>
               <a:ext uri="{91240B29-F687-4f45-9708-019B960494DF}">
-                <a14:hiddenLine xmlns="" xmlns:a14="http://schemas.microsoft.com/office/drawing/2010/main" w="9525">
+                <a14:hiddenLine xmlns:a14="http://schemas.microsoft.com/office/drawing/2010/main" xmlns="" w="9525">
                   <a:solidFill>
                     <a:srgbClr val="000000"/>
                   </a:solidFill>
@@ -2564,7 +2569,7 @@
             </a:ln>
             <a:extLst>
               <a:ext uri="{91240B29-F687-4f45-9708-019B960494DF}">
-                <a14:hiddenLine xmlns="" xmlns:a14="http://schemas.microsoft.com/office/drawing/2010/main" w="9525">
+                <a14:hiddenLine xmlns:a14="http://schemas.microsoft.com/office/drawing/2010/main" xmlns="" w="9525">
                   <a:solidFill>
                     <a:srgbClr val="000000"/>
                   </a:solidFill>
@@ -2654,7 +2659,7 @@
             </a:ln>
             <a:extLst>
               <a:ext uri="{91240B29-F687-4f45-9708-019B960494DF}">
-                <a14:hiddenLine xmlns="" xmlns:a14="http://schemas.microsoft.com/office/drawing/2010/main" w="9525">
+                <a14:hiddenLine xmlns:a14="http://schemas.microsoft.com/office/drawing/2010/main" xmlns="" w="9525">
                   <a:solidFill>
                     <a:srgbClr val="000000"/>
                   </a:solidFill>
@@ -2722,7 +2727,7 @@
             </a:ln>
             <a:extLst>
               <a:ext uri="{91240B29-F687-4f45-9708-019B960494DF}">
-                <a14:hiddenLine xmlns="" xmlns:a14="http://schemas.microsoft.com/office/drawing/2010/main" w="9525">
+                <a14:hiddenLine xmlns:a14="http://schemas.microsoft.com/office/drawing/2010/main" xmlns="" w="9525">
                   <a:solidFill>
                     <a:srgbClr val="000000"/>
                   </a:solidFill>
@@ -2784,7 +2789,7 @@
             </a:ln>
             <a:extLst>
               <a:ext uri="{91240B29-F687-4f45-9708-019B960494DF}">
-                <a14:hiddenLine xmlns="" xmlns:a14="http://schemas.microsoft.com/office/drawing/2010/main" w="9525">
+                <a14:hiddenLine xmlns:a14="http://schemas.microsoft.com/office/drawing/2010/main" xmlns="" w="9525">
                   <a:solidFill>
                     <a:srgbClr val="000000"/>
                   </a:solidFill>
@@ -2874,7 +2879,7 @@
             </a:ln>
             <a:extLst>
               <a:ext uri="{91240B29-F687-4f45-9708-019B960494DF}">
-                <a14:hiddenLine xmlns="" xmlns:a14="http://schemas.microsoft.com/office/drawing/2010/main" w="9525">
+                <a14:hiddenLine xmlns:a14="http://schemas.microsoft.com/office/drawing/2010/main" xmlns="" w="9525">
                   <a:solidFill>
                     <a:srgbClr val="000000"/>
                   </a:solidFill>
@@ -2936,7 +2941,7 @@
             </a:ln>
             <a:extLst>
               <a:ext uri="{91240B29-F687-4f45-9708-019B960494DF}">
-                <a14:hiddenLine xmlns="" xmlns:a14="http://schemas.microsoft.com/office/drawing/2010/main" w="9525">
+                <a14:hiddenLine xmlns:a14="http://schemas.microsoft.com/office/drawing/2010/main" xmlns="" w="9525">
                   <a:solidFill>
                     <a:srgbClr val="000000"/>
                   </a:solidFill>
@@ -3026,7 +3031,7 @@
             </a:ln>
             <a:extLst>
               <a:ext uri="{91240B29-F687-4f45-9708-019B960494DF}">
-                <a14:hiddenLine xmlns="" xmlns:a14="http://schemas.microsoft.com/office/drawing/2010/main" w="9525">
+                <a14:hiddenLine xmlns:a14="http://schemas.microsoft.com/office/drawing/2010/main" xmlns="" w="9525">
                   <a:solidFill>
                     <a:srgbClr val="000000"/>
                   </a:solidFill>
@@ -3088,7 +3093,7 @@
             </a:ln>
             <a:extLst>
               <a:ext uri="{91240B29-F687-4f45-9708-019B960494DF}">
-                <a14:hiddenLine xmlns="" xmlns:a14="http://schemas.microsoft.com/office/drawing/2010/main" w="9525">
+                <a14:hiddenLine xmlns:a14="http://schemas.microsoft.com/office/drawing/2010/main" xmlns="" w="9525">
                   <a:solidFill>
                     <a:srgbClr val="000000"/>
                   </a:solidFill>
@@ -3178,7 +3183,7 @@
             </a:ln>
             <a:extLst>
               <a:ext uri="{91240B29-F687-4f45-9708-019B960494DF}">
-                <a14:hiddenLine xmlns="" xmlns:a14="http://schemas.microsoft.com/office/drawing/2010/main" w="9525">
+                <a14:hiddenLine xmlns:a14="http://schemas.microsoft.com/office/drawing/2010/main" xmlns="" w="9525">
                   <a:solidFill>
                     <a:srgbClr val="000000"/>
                   </a:solidFill>
@@ -3212,7 +3217,7 @@
             </a:ln>
             <a:extLst>
               <a:ext uri="{91240B29-F687-4f45-9708-019B960494DF}">
-                <a14:hiddenLine xmlns="" xmlns:a14="http://schemas.microsoft.com/office/drawing/2010/main" w="9525">
+                <a14:hiddenLine xmlns:a14="http://schemas.microsoft.com/office/drawing/2010/main" xmlns="" w="9525">
                   <a:solidFill>
                     <a:srgbClr val="000000"/>
                   </a:solidFill>
@@ -3277,7 +3282,7 @@
             </a:ln>
             <a:extLst>
               <a:ext uri="{91240B29-F687-4f45-9708-019B960494DF}">
-                <a14:hiddenLine xmlns="" xmlns:a14="http://schemas.microsoft.com/office/drawing/2010/main" w="9525">
+                <a14:hiddenLine xmlns:a14="http://schemas.microsoft.com/office/drawing/2010/main" xmlns="" w="9525">
                   <a:solidFill>
                     <a:srgbClr val="000000"/>
                   </a:solidFill>
@@ -3367,7 +3372,7 @@
             </a:ln>
             <a:extLst>
               <a:ext uri="{91240B29-F687-4f45-9708-019B960494DF}">
-                <a14:hiddenLine xmlns="" xmlns:a14="http://schemas.microsoft.com/office/drawing/2010/main" w="9525">
+                <a14:hiddenLine xmlns:a14="http://schemas.microsoft.com/office/drawing/2010/main" xmlns="" w="9525">
                   <a:solidFill>
                     <a:srgbClr val="000000"/>
                   </a:solidFill>
@@ -3429,7 +3434,7 @@
             </a:ln>
             <a:extLst>
               <a:ext uri="{91240B29-F687-4f45-9708-019B960494DF}">
-                <a14:hiddenLine xmlns="" xmlns:a14="http://schemas.microsoft.com/office/drawing/2010/main" w="9525">
+                <a14:hiddenLine xmlns:a14="http://schemas.microsoft.com/office/drawing/2010/main" xmlns="" w="9525">
                   <a:solidFill>
                     <a:srgbClr val="000000"/>
                   </a:solidFill>
@@ -3519,7 +3524,7 @@
             </a:ln>
             <a:extLst>
               <a:ext uri="{91240B29-F687-4f45-9708-019B960494DF}">
-                <a14:hiddenLine xmlns="" xmlns:a14="http://schemas.microsoft.com/office/drawing/2010/main" w="9525">
+                <a14:hiddenLine xmlns:a14="http://schemas.microsoft.com/office/drawing/2010/main" xmlns="" w="9525">
                   <a:solidFill>
                     <a:srgbClr val="000000"/>
                   </a:solidFill>
@@ -3609,7 +3614,7 @@
             </a:ln>
             <a:extLst>
               <a:ext uri="{91240B29-F687-4f45-9708-019B960494DF}">
-                <a14:hiddenLine xmlns="" xmlns:a14="http://schemas.microsoft.com/office/drawing/2010/main" w="9525">
+                <a14:hiddenLine xmlns:a14="http://schemas.microsoft.com/office/drawing/2010/main" xmlns="" w="9525">
                   <a:solidFill>
                     <a:srgbClr val="000000"/>
                   </a:solidFill>
@@ -3674,7 +3679,7 @@
             </a:ln>
             <a:extLst>
               <a:ext uri="{91240B29-F687-4f45-9708-019B960494DF}">
-                <a14:hiddenLine xmlns="" xmlns:a14="http://schemas.microsoft.com/office/drawing/2010/main" w="9525">
+                <a14:hiddenLine xmlns:a14="http://schemas.microsoft.com/office/drawing/2010/main" xmlns="" w="9525">
                   <a:solidFill>
                     <a:srgbClr val="000000"/>
                   </a:solidFill>
@@ -3736,7 +3741,7 @@
             </a:ln>
             <a:extLst>
               <a:ext uri="{91240B29-F687-4f45-9708-019B960494DF}">
-                <a14:hiddenLine xmlns="" xmlns:a14="http://schemas.microsoft.com/office/drawing/2010/main" w="9525">
+                <a14:hiddenLine xmlns:a14="http://schemas.microsoft.com/office/drawing/2010/main" xmlns="" w="9525">
                   <a:solidFill>
                     <a:srgbClr val="000000"/>
                   </a:solidFill>
@@ -3826,7 +3831,7 @@
             </a:ln>
             <a:extLst>
               <a:ext uri="{91240B29-F687-4f45-9708-019B960494DF}">
-                <a14:hiddenLine xmlns="" xmlns:a14="http://schemas.microsoft.com/office/drawing/2010/main" w="9525">
+                <a14:hiddenLine xmlns:a14="http://schemas.microsoft.com/office/drawing/2010/main" xmlns="" w="9525">
                   <a:solidFill>
                     <a:srgbClr val="000000"/>
                   </a:solidFill>
@@ -3916,7 +3921,7 @@
             </a:ln>
             <a:extLst>
               <a:ext uri="{91240B29-F687-4f45-9708-019B960494DF}">
-                <a14:hiddenLine xmlns="" xmlns:a14="http://schemas.microsoft.com/office/drawing/2010/main" w="9525">
+                <a14:hiddenLine xmlns:a14="http://schemas.microsoft.com/office/drawing/2010/main" xmlns="" w="9525">
                   <a:solidFill>
                     <a:srgbClr val="000000"/>
                   </a:solidFill>
@@ -3978,7 +3983,7 @@
             </a:ln>
             <a:extLst>
               <a:ext uri="{91240B29-F687-4f45-9708-019B960494DF}">
-                <a14:hiddenLine xmlns="" xmlns:a14="http://schemas.microsoft.com/office/drawing/2010/main" w="9525">
+                <a14:hiddenLine xmlns:a14="http://schemas.microsoft.com/office/drawing/2010/main" xmlns="" w="9525">
                   <a:solidFill>
                     <a:srgbClr val="000000"/>
                   </a:solidFill>
@@ -4098,7 +4103,7 @@
             </a:ln>
             <a:extLst>
               <a:ext uri="{91240B29-F687-4f45-9708-019B960494DF}">
-                <a14:hiddenLine xmlns="" xmlns:a14="http://schemas.microsoft.com/office/drawing/2010/main" w="9525">
+                <a14:hiddenLine xmlns:a14="http://schemas.microsoft.com/office/drawing/2010/main" xmlns="" w="9525">
                   <a:solidFill>
                     <a:srgbClr val="000000"/>
                   </a:solidFill>
@@ -4166,7 +4171,7 @@
             </a:ln>
             <a:extLst>
               <a:ext uri="{91240B29-F687-4f45-9708-019B960494DF}">
-                <a14:hiddenLine xmlns="" xmlns:a14="http://schemas.microsoft.com/office/drawing/2010/main" w="9525">
+                <a14:hiddenLine xmlns:a14="http://schemas.microsoft.com/office/drawing/2010/main" xmlns="" w="9525">
                   <a:solidFill>
                     <a:srgbClr val="000000"/>
                   </a:solidFill>
@@ -4256,7 +4261,7 @@
             </a:ln>
             <a:extLst>
               <a:ext uri="{91240B29-F687-4f45-9708-019B960494DF}">
-                <a14:hiddenLine xmlns="" xmlns:a14="http://schemas.microsoft.com/office/drawing/2010/main" w="9525">
+                <a14:hiddenLine xmlns:a14="http://schemas.microsoft.com/office/drawing/2010/main" xmlns="" w="9525">
                   <a:solidFill>
                     <a:srgbClr val="000000"/>
                   </a:solidFill>
@@ -8985,7 +8990,7 @@
           <a:noFill/>
           <a:extLst>
             <a:ext uri="{909E8E84-426E-40dd-AFC4-6F175D3DCCD1}">
-              <a14:hiddenFill xmlns="" xmlns:a14="http://schemas.microsoft.com/office/drawing/2010/main">
+              <a14:hiddenFill xmlns:a14="http://schemas.microsoft.com/office/drawing/2010/main" xmlns="">
                 <a:solidFill>
                   <a:srgbClr val="FFFFFF"/>
                 </a:solidFill>
@@ -9059,7 +9064,7 @@
               </a:ln>
               <a:extLst>
                 <a:ext uri="{91240B29-F687-4f45-9708-019B960494DF}">
-                  <a14:hiddenLine xmlns="" xmlns:a14="http://schemas.microsoft.com/office/drawing/2010/main" w="9525">
+                  <a14:hiddenLine xmlns:a14="http://schemas.microsoft.com/office/drawing/2010/main" xmlns="" w="9525">
                     <a:solidFill>
                       <a:srgbClr val="000000"/>
                     </a:solidFill>
@@ -9149,7 +9154,7 @@
               </a:ln>
               <a:extLst>
                 <a:ext uri="{91240B29-F687-4f45-9708-019B960494DF}">
-                  <a14:hiddenLine xmlns="" xmlns:a14="http://schemas.microsoft.com/office/drawing/2010/main" w="9525">
+                  <a14:hiddenLine xmlns:a14="http://schemas.microsoft.com/office/drawing/2010/main" xmlns="" w="9525">
                     <a:solidFill>
                       <a:srgbClr val="000000"/>
                     </a:solidFill>
@@ -9239,7 +9244,7 @@
               </a:ln>
               <a:extLst>
                 <a:ext uri="{91240B29-F687-4f45-9708-019B960494DF}">
-                  <a14:hiddenLine xmlns="" xmlns:a14="http://schemas.microsoft.com/office/drawing/2010/main" w="9525">
+                  <a14:hiddenLine xmlns:a14="http://schemas.microsoft.com/office/drawing/2010/main" xmlns="" w="9525">
                     <a:solidFill>
                       <a:srgbClr val="000000"/>
                     </a:solidFill>
@@ -9301,7 +9306,7 @@
               </a:ln>
               <a:extLst>
                 <a:ext uri="{91240B29-F687-4f45-9708-019B960494DF}">
-                  <a14:hiddenLine xmlns="" xmlns:a14="http://schemas.microsoft.com/office/drawing/2010/main" w="9525">
+                  <a14:hiddenLine xmlns:a14="http://schemas.microsoft.com/office/drawing/2010/main" xmlns="" w="9525">
                     <a:solidFill>
                       <a:srgbClr val="000000"/>
                     </a:solidFill>
@@ -9391,7 +9396,7 @@
               </a:ln>
               <a:extLst>
                 <a:ext uri="{91240B29-F687-4f45-9708-019B960494DF}">
-                  <a14:hiddenLine xmlns="" xmlns:a14="http://schemas.microsoft.com/office/drawing/2010/main" w="9525">
+                  <a14:hiddenLine xmlns:a14="http://schemas.microsoft.com/office/drawing/2010/main" xmlns="" w="9525">
                     <a:solidFill>
                       <a:srgbClr val="000000"/>
                     </a:solidFill>
@@ -9453,7 +9458,7 @@
               </a:ln>
               <a:extLst>
                 <a:ext uri="{91240B29-F687-4f45-9708-019B960494DF}">
-                  <a14:hiddenLine xmlns="" xmlns:a14="http://schemas.microsoft.com/office/drawing/2010/main" w="9525">
+                  <a14:hiddenLine xmlns:a14="http://schemas.microsoft.com/office/drawing/2010/main" xmlns="" w="9525">
                     <a:solidFill>
                       <a:srgbClr val="000000"/>
                     </a:solidFill>
@@ -9515,7 +9520,7 @@
               </a:ln>
               <a:extLst>
                 <a:ext uri="{91240B29-F687-4f45-9708-019B960494DF}">
-                  <a14:hiddenLine xmlns="" xmlns:a14="http://schemas.microsoft.com/office/drawing/2010/main" w="9525">
+                  <a14:hiddenLine xmlns:a14="http://schemas.microsoft.com/office/drawing/2010/main" xmlns="" w="9525">
                     <a:solidFill>
                       <a:srgbClr val="000000"/>
                     </a:solidFill>
@@ -9605,7 +9610,7 @@
               </a:ln>
               <a:extLst>
                 <a:ext uri="{91240B29-F687-4f45-9708-019B960494DF}">
-                  <a14:hiddenLine xmlns="" xmlns:a14="http://schemas.microsoft.com/office/drawing/2010/main" w="9525">
+                  <a14:hiddenLine xmlns:a14="http://schemas.microsoft.com/office/drawing/2010/main" xmlns="" w="9525">
                     <a:solidFill>
                       <a:srgbClr val="000000"/>
                     </a:solidFill>
@@ -9695,7 +9700,7 @@
               </a:ln>
               <a:extLst>
                 <a:ext uri="{91240B29-F687-4f45-9708-019B960494DF}">
-                  <a14:hiddenLine xmlns="" xmlns:a14="http://schemas.microsoft.com/office/drawing/2010/main" w="9525">
+                  <a14:hiddenLine xmlns:a14="http://schemas.microsoft.com/office/drawing/2010/main" xmlns="" w="9525">
                     <a:solidFill>
                       <a:srgbClr val="000000"/>
                     </a:solidFill>
@@ -9757,7 +9762,7 @@
               </a:ln>
               <a:extLst>
                 <a:ext uri="{91240B29-F687-4f45-9708-019B960494DF}">
-                  <a14:hiddenLine xmlns="" xmlns:a14="http://schemas.microsoft.com/office/drawing/2010/main" w="9525">
+                  <a14:hiddenLine xmlns:a14="http://schemas.microsoft.com/office/drawing/2010/main" xmlns="" w="9525">
                     <a:solidFill>
                       <a:srgbClr val="000000"/>
                     </a:solidFill>
@@ -9867,7 +9872,7 @@
               </a:ln>
               <a:extLst>
                 <a:ext uri="{91240B29-F687-4f45-9708-019B960494DF}">
-                  <a14:hiddenLine xmlns="" xmlns:a14="http://schemas.microsoft.com/office/drawing/2010/main" w="9525">
+                  <a14:hiddenLine xmlns:a14="http://schemas.microsoft.com/office/drawing/2010/main" xmlns="" w="9525">
                     <a:solidFill>
                       <a:srgbClr val="000000"/>
                     </a:solidFill>
@@ -9951,7 +9956,7 @@
               </a:ln>
               <a:extLst>
                 <a:ext uri="{91240B29-F687-4f45-9708-019B960494DF}">
-                  <a14:hiddenLine xmlns="" xmlns:a14="http://schemas.microsoft.com/office/drawing/2010/main" w="9525">
+                  <a14:hiddenLine xmlns:a14="http://schemas.microsoft.com/office/drawing/2010/main" xmlns="" w="9525">
                     <a:solidFill>
                       <a:srgbClr val="000000"/>
                     </a:solidFill>
@@ -10013,7 +10018,7 @@
               </a:ln>
               <a:extLst>
                 <a:ext uri="{91240B29-F687-4f45-9708-019B960494DF}">
-                  <a14:hiddenLine xmlns="" xmlns:a14="http://schemas.microsoft.com/office/drawing/2010/main" w="9525">
+                  <a14:hiddenLine xmlns:a14="http://schemas.microsoft.com/office/drawing/2010/main" xmlns="" w="9525">
                     <a:solidFill>
                       <a:srgbClr val="000000"/>
                     </a:solidFill>
@@ -10075,7 +10080,7 @@
               </a:ln>
               <a:extLst>
                 <a:ext uri="{91240B29-F687-4f45-9708-019B960494DF}">
-                  <a14:hiddenLine xmlns="" xmlns:a14="http://schemas.microsoft.com/office/drawing/2010/main" w="9525">
+                  <a14:hiddenLine xmlns:a14="http://schemas.microsoft.com/office/drawing/2010/main" xmlns="" w="9525">
                     <a:solidFill>
                       <a:srgbClr val="000000"/>
                     </a:solidFill>
@@ -10165,7 +10170,7 @@
               </a:ln>
               <a:extLst>
                 <a:ext uri="{91240B29-F687-4f45-9708-019B960494DF}">
-                  <a14:hiddenLine xmlns="" xmlns:a14="http://schemas.microsoft.com/office/drawing/2010/main" w="9525">
+                  <a14:hiddenLine xmlns:a14="http://schemas.microsoft.com/office/drawing/2010/main" xmlns="" w="9525">
                     <a:solidFill>
                       <a:srgbClr val="000000"/>
                     </a:solidFill>
@@ -10199,7 +10204,7 @@
               </a:ln>
               <a:extLst>
                 <a:ext uri="{91240B29-F687-4f45-9708-019B960494DF}">
-                  <a14:hiddenLine xmlns="" xmlns:a14="http://schemas.microsoft.com/office/drawing/2010/main" w="9525">
+                  <a14:hiddenLine xmlns:a14="http://schemas.microsoft.com/office/drawing/2010/main" xmlns="" w="9525">
                     <a:solidFill>
                       <a:srgbClr val="000000"/>
                     </a:solidFill>
@@ -10264,7 +10269,7 @@
               </a:ln>
               <a:extLst>
                 <a:ext uri="{91240B29-F687-4f45-9708-019B960494DF}">
-                  <a14:hiddenLine xmlns="" xmlns:a14="http://schemas.microsoft.com/office/drawing/2010/main" w="9525">
+                  <a14:hiddenLine xmlns:a14="http://schemas.microsoft.com/office/drawing/2010/main" xmlns="" w="9525">
                     <a:solidFill>
                       <a:srgbClr val="000000"/>
                     </a:solidFill>
@@ -10354,7 +10359,7 @@
               </a:ln>
               <a:extLst>
                 <a:ext uri="{91240B29-F687-4f45-9708-019B960494DF}">
-                  <a14:hiddenLine xmlns="" xmlns:a14="http://schemas.microsoft.com/office/drawing/2010/main" w="9525">
+                  <a14:hiddenLine xmlns:a14="http://schemas.microsoft.com/office/drawing/2010/main" xmlns="" w="9525">
                     <a:solidFill>
                       <a:srgbClr val="000000"/>
                     </a:solidFill>
@@ -10416,7 +10421,7 @@
               </a:ln>
               <a:extLst>
                 <a:ext uri="{91240B29-F687-4f45-9708-019B960494DF}">
-                  <a14:hiddenLine xmlns="" xmlns:a14="http://schemas.microsoft.com/office/drawing/2010/main" w="9525">
+                  <a14:hiddenLine xmlns:a14="http://schemas.microsoft.com/office/drawing/2010/main" xmlns="" w="9525">
                     <a:solidFill>
                       <a:srgbClr val="000000"/>
                     </a:solidFill>
@@ -10506,7 +10511,7 @@
               </a:ln>
               <a:extLst>
                 <a:ext uri="{91240B29-F687-4f45-9708-019B960494DF}">
-                  <a14:hiddenLine xmlns="" xmlns:a14="http://schemas.microsoft.com/office/drawing/2010/main" w="9525">
+                  <a14:hiddenLine xmlns:a14="http://schemas.microsoft.com/office/drawing/2010/main" xmlns="" w="9525">
                     <a:solidFill>
                       <a:srgbClr val="000000"/>
                     </a:solidFill>
@@ -10571,7 +10576,7 @@
               </a:ln>
               <a:extLst>
                 <a:ext uri="{91240B29-F687-4f45-9708-019B960494DF}">
-                  <a14:hiddenLine xmlns="" xmlns:a14="http://schemas.microsoft.com/office/drawing/2010/main" w="9525">
+                  <a14:hiddenLine xmlns:a14="http://schemas.microsoft.com/office/drawing/2010/main" xmlns="" w="9525">
                     <a:solidFill>
                       <a:srgbClr val="000000"/>
                     </a:solidFill>
@@ -10633,7 +10638,7 @@
               </a:ln>
               <a:extLst>
                 <a:ext uri="{91240B29-F687-4f45-9708-019B960494DF}">
-                  <a14:hiddenLine xmlns="" xmlns:a14="http://schemas.microsoft.com/office/drawing/2010/main" w="9525">
+                  <a14:hiddenLine xmlns:a14="http://schemas.microsoft.com/office/drawing/2010/main" xmlns="" w="9525">
                     <a:solidFill>
                       <a:srgbClr val="000000"/>
                     </a:solidFill>
@@ -10723,7 +10728,7 @@
               </a:ln>
               <a:extLst>
                 <a:ext uri="{91240B29-F687-4f45-9708-019B960494DF}">
-                  <a14:hiddenLine xmlns="" xmlns:a14="http://schemas.microsoft.com/office/drawing/2010/main" w="9525">
+                  <a14:hiddenLine xmlns:a14="http://schemas.microsoft.com/office/drawing/2010/main" xmlns="" w="9525">
                     <a:solidFill>
                       <a:srgbClr val="000000"/>
                     </a:solidFill>
@@ -10813,7 +10818,7 @@
               </a:ln>
               <a:extLst>
                 <a:ext uri="{91240B29-F687-4f45-9708-019B960494DF}">
-                  <a14:hiddenLine xmlns="" xmlns:a14="http://schemas.microsoft.com/office/drawing/2010/main" w="9525">
+                  <a14:hiddenLine xmlns:a14="http://schemas.microsoft.com/office/drawing/2010/main" xmlns="" w="9525">
                     <a:solidFill>
                       <a:srgbClr val="000000"/>
                     </a:solidFill>
@@ -10878,7 +10883,7 @@
               </a:ln>
               <a:extLst>
                 <a:ext uri="{91240B29-F687-4f45-9708-019B960494DF}">
-                  <a14:hiddenLine xmlns="" xmlns:a14="http://schemas.microsoft.com/office/drawing/2010/main" w="9525">
+                  <a14:hiddenLine xmlns:a14="http://schemas.microsoft.com/office/drawing/2010/main" xmlns="" w="9525">
                     <a:solidFill>
                       <a:srgbClr val="000000"/>
                     </a:solidFill>
@@ -10998,7 +11003,7 @@
               </a:ln>
               <a:extLst>
                 <a:ext uri="{91240B29-F687-4f45-9708-019B960494DF}">
-                  <a14:hiddenLine xmlns="" xmlns:a14="http://schemas.microsoft.com/office/drawing/2010/main" w="9525">
+                  <a14:hiddenLine xmlns:a14="http://schemas.microsoft.com/office/drawing/2010/main" xmlns="" w="9525">
                     <a:solidFill>
                       <a:srgbClr val="000000"/>
                     </a:solidFill>
@@ -11096,7 +11101,7 @@
               </a:ln>
               <a:extLst>
                 <a:ext uri="{91240B29-F687-4f45-9708-019B960494DF}">
-                  <a14:hiddenLine xmlns="" xmlns:a14="http://schemas.microsoft.com/office/drawing/2010/main" w="9525">
+                  <a14:hiddenLine xmlns:a14="http://schemas.microsoft.com/office/drawing/2010/main" xmlns="" w="9525">
                     <a:solidFill>
                       <a:srgbClr val="000000"/>
                     </a:solidFill>
@@ -11211,7 +11216,7 @@
               </a:ln>
               <a:extLst>
                 <a:ext uri="{91240B29-F687-4f45-9708-019B960494DF}">
-                  <a14:hiddenLine xmlns="" xmlns:a14="http://schemas.microsoft.com/office/drawing/2010/main" w="9525">
+                  <a14:hiddenLine xmlns:a14="http://schemas.microsoft.com/office/drawing/2010/main" xmlns="" w="9525">
                     <a:solidFill>
                       <a:srgbClr val="000000"/>
                     </a:solidFill>
@@ -11301,7 +11306,7 @@
               </a:ln>
               <a:extLst>
                 <a:ext uri="{91240B29-F687-4f45-9708-019B960494DF}">
-                  <a14:hiddenLine xmlns="" xmlns:a14="http://schemas.microsoft.com/office/drawing/2010/main" w="9525">
+                  <a14:hiddenLine xmlns:a14="http://schemas.microsoft.com/office/drawing/2010/main" xmlns="" w="9525">
                     <a:solidFill>
                       <a:srgbClr val="000000"/>
                     </a:solidFill>
@@ -11366,7 +11371,7 @@
               </a:ln>
               <a:extLst>
                 <a:ext uri="{91240B29-F687-4f45-9708-019B960494DF}">
-                  <a14:hiddenLine xmlns="" xmlns:a14="http://schemas.microsoft.com/office/drawing/2010/main" w="9525">
+                  <a14:hiddenLine xmlns:a14="http://schemas.microsoft.com/office/drawing/2010/main" xmlns="" w="9525">
                     <a:solidFill>
                       <a:srgbClr val="000000"/>
                     </a:solidFill>
@@ -11456,7 +11461,7 @@
               </a:ln>
               <a:extLst>
                 <a:ext uri="{91240B29-F687-4f45-9708-019B960494DF}">
-                  <a14:hiddenLine xmlns="" xmlns:a14="http://schemas.microsoft.com/office/drawing/2010/main" w="9525">
+                  <a14:hiddenLine xmlns:a14="http://schemas.microsoft.com/office/drawing/2010/main" xmlns="" w="9525">
                     <a:solidFill>
                       <a:srgbClr val="000000"/>
                     </a:solidFill>
@@ -11524,7 +11529,7 @@
               </a:ln>
               <a:extLst>
                 <a:ext uri="{91240B29-F687-4f45-9708-019B960494DF}">
-                  <a14:hiddenLine xmlns="" xmlns:a14="http://schemas.microsoft.com/office/drawing/2010/main" w="9525">
+                  <a14:hiddenLine xmlns:a14="http://schemas.microsoft.com/office/drawing/2010/main" xmlns="" w="9525">
                     <a:solidFill>
                       <a:srgbClr val="000000"/>
                     </a:solidFill>
@@ -11614,7 +11619,7 @@
               </a:ln>
               <a:extLst>
                 <a:ext uri="{91240B29-F687-4f45-9708-019B960494DF}">
-                  <a14:hiddenLine xmlns="" xmlns:a14="http://schemas.microsoft.com/office/drawing/2010/main" w="9525">
+                  <a14:hiddenLine xmlns:a14="http://schemas.microsoft.com/office/drawing/2010/main" xmlns="" w="9525">
                     <a:solidFill>
                       <a:srgbClr val="000000"/>
                     </a:solidFill>
@@ -11682,7 +11687,7 @@
               </a:ln>
               <a:extLst>
                 <a:ext uri="{91240B29-F687-4f45-9708-019B960494DF}">
-                  <a14:hiddenLine xmlns="" xmlns:a14="http://schemas.microsoft.com/office/drawing/2010/main" w="9525">
+                  <a14:hiddenLine xmlns:a14="http://schemas.microsoft.com/office/drawing/2010/main" xmlns="" w="9525">
                     <a:solidFill>
                       <a:srgbClr val="000000"/>
                     </a:solidFill>
@@ -11772,7 +11777,7 @@
               </a:ln>
               <a:extLst>
                 <a:ext uri="{91240B29-F687-4f45-9708-019B960494DF}">
-                  <a14:hiddenLine xmlns="" xmlns:a14="http://schemas.microsoft.com/office/drawing/2010/main" w="9525">
+                  <a14:hiddenLine xmlns:a14="http://schemas.microsoft.com/office/drawing/2010/main" xmlns="" w="9525">
                     <a:solidFill>
                       <a:srgbClr val="000000"/>
                     </a:solidFill>
@@ -11806,7 +11811,7 @@
               </a:ln>
               <a:extLst>
                 <a:ext uri="{91240B29-F687-4f45-9708-019B960494DF}">
-                  <a14:hiddenLine xmlns="" xmlns:a14="http://schemas.microsoft.com/office/drawing/2010/main" w="9525">
+                  <a14:hiddenLine xmlns:a14="http://schemas.microsoft.com/office/drawing/2010/main" xmlns="" w="9525">
                     <a:solidFill>
                       <a:srgbClr val="000000"/>
                     </a:solidFill>
@@ -12529,10 +12534,1137 @@
           <a:chExt cx="0" cy="0"/>
         </a:xfrm>
       </p:grpSpPr>
+      <p:sp>
+        <p:nvSpPr>
+          <p:cNvPr id="3" name="CuadroTexto 2">
+            <a:extLst>
+              <a:ext uri="{FF2B5EF4-FFF2-40B4-BE49-F238E27FC236}">
+                <a16:creationId xmlns:a16="http://schemas.microsoft.com/office/drawing/2014/main" id="{BA718D4B-D863-6FBE-F398-54B56FF2654F}"/>
+              </a:ext>
+            </a:extLst>
+          </p:cNvPr>
+          <p:cNvSpPr txBox="1"/>
+          <p:nvPr/>
+        </p:nvSpPr>
+        <p:spPr>
+          <a:xfrm>
+            <a:off x="1328468" y="632604"/>
+            <a:ext cx="9742098" cy="5755422"/>
+          </a:xfrm>
+          <a:prstGeom prst="rect">
+            <a:avLst/>
+          </a:prstGeom>
+          <a:noFill/>
+        </p:spPr>
+        <p:txBody>
+          <a:bodyPr wrap="square" rtlCol="0">
+            <a:spAutoFit/>
+          </a:bodyPr>
+          <a:lstStyle/>
+          <a:p>
+            <a:r>
+              <a:rPr lang="es-ES" sz="3200" b="1" dirty="0"/>
+              <a:t>Archivos Clave del </a:t>
+            </a:r>
+            <a:r>
+              <a:rPr lang="es-ES" sz="3200" b="1" dirty="0" err="1"/>
+              <a:t>Dataset</a:t>
+            </a:r>
+            <a:endParaRPr lang="es-ES" sz="3200" b="1" dirty="0"/>
+          </a:p>
+          <a:p>
+            <a:endParaRPr lang="es-ES" b="1" dirty="0"/>
+          </a:p>
+          <a:p>
+            <a:endParaRPr lang="es-ES" b="1" dirty="0"/>
+          </a:p>
+          <a:p>
+            <a:endParaRPr lang="es-ES" b="1" dirty="0"/>
+          </a:p>
+          <a:p>
+            <a:pPr>
+              <a:buFont typeface="Arial" panose="020B0604020202020204" pitchFamily="34" charset="0"/>
+              <a:buChar char="•"/>
+            </a:pPr>
+            <a:r>
+              <a:rPr lang="es-ES" sz="2400" b="1" dirty="0"/>
+              <a:t>Gas Holandés (NYMEX):</a:t>
+            </a:r>
+            <a:r>
+              <a:rPr lang="es-ES" sz="2400" dirty="0"/>
+              <a:t> Datos sobre futuros energéticos, clave para los precios europeos.</a:t>
+            </a:r>
+          </a:p>
+          <a:p>
+            <a:pPr>
+              <a:buFont typeface="Arial" panose="020B0604020202020204" pitchFamily="34" charset="0"/>
+              <a:buChar char="•"/>
+            </a:pPr>
+            <a:endParaRPr lang="es-ES" dirty="0"/>
+          </a:p>
+          <a:p>
+            <a:pPr>
+              <a:buFont typeface="Arial" panose="020B0604020202020204" pitchFamily="34" charset="0"/>
+              <a:buChar char="•"/>
+            </a:pPr>
+            <a:endParaRPr lang="es-ES" dirty="0"/>
+          </a:p>
+          <a:p>
+            <a:pPr>
+              <a:buFont typeface="Arial" panose="020B0604020202020204" pitchFamily="34" charset="0"/>
+              <a:buChar char="•"/>
+            </a:pPr>
+            <a:r>
+              <a:rPr lang="es-ES" sz="2400" b="1" dirty="0"/>
+              <a:t>Producción Eléctrica:</a:t>
+            </a:r>
+            <a:r>
+              <a:rPr lang="es-ES" sz="2400" dirty="0"/>
+              <a:t> Desglose por fuente (renovables, fósiles, etc.).</a:t>
+            </a:r>
+          </a:p>
+          <a:p>
+            <a:pPr>
+              <a:buFont typeface="Arial" panose="020B0604020202020204" pitchFamily="34" charset="0"/>
+              <a:buChar char="•"/>
+            </a:pPr>
+            <a:endParaRPr lang="es-ES" dirty="0"/>
+          </a:p>
+          <a:p>
+            <a:pPr>
+              <a:buFont typeface="Arial" panose="020B0604020202020204" pitchFamily="34" charset="0"/>
+              <a:buChar char="•"/>
+            </a:pPr>
+            <a:endParaRPr lang="es-ES" sz="2400" dirty="0"/>
+          </a:p>
+          <a:p>
+            <a:pPr>
+              <a:buFont typeface="Arial" panose="020B0604020202020204" pitchFamily="34" charset="0"/>
+              <a:buChar char="•"/>
+            </a:pPr>
+            <a:r>
+              <a:rPr lang="es-ES" sz="2400" b="1" dirty="0"/>
+              <a:t>Demanda Horaria:</a:t>
+            </a:r>
+            <a:r>
+              <a:rPr lang="es-ES" sz="2400" dirty="0"/>
+              <a:t> Ajustada a las variaciones a lo largo de los años.</a:t>
+            </a:r>
+          </a:p>
+          <a:p>
+            <a:endParaRPr lang="es-ES" dirty="0"/>
+          </a:p>
+          <a:p>
+            <a:endParaRPr lang="es-ES" sz="2400" dirty="0"/>
+          </a:p>
+          <a:p>
+            <a:pPr>
+              <a:buFont typeface="Arial" panose="020B0604020202020204" pitchFamily="34" charset="0"/>
+              <a:buChar char="•"/>
+            </a:pPr>
+            <a:r>
+              <a:rPr lang="es-ES" sz="2400" b="1" dirty="0"/>
+              <a:t>Precios Horarios:</a:t>
+            </a:r>
+            <a:r>
+              <a:rPr lang="es-ES" sz="2400" dirty="0"/>
+              <a:t> Expresados en €/</a:t>
+            </a:r>
+            <a:r>
+              <a:rPr lang="es-ES" sz="2400" dirty="0" err="1"/>
+              <a:t>MWh</a:t>
+            </a:r>
+            <a:r>
+              <a:rPr lang="es-ES" sz="2400" dirty="0"/>
+              <a:t>, considerando tendencias económicas.</a:t>
+            </a:r>
+          </a:p>
+          <a:p>
+            <a:endParaRPr lang="es-ES" dirty="0"/>
+          </a:p>
+        </p:txBody>
+      </p:sp>
     </p:spTree>
     <p:extLst>
       <p:ext uri="{BB962C8B-B14F-4D97-AF65-F5344CB8AC3E}">
         <p14:creationId xmlns:p14="http://schemas.microsoft.com/office/powerpoint/2010/main" val="432237865"/>
+      </p:ext>
+    </p:extLst>
+  </p:cSld>
+  <p:clrMapOvr>
+    <a:masterClrMapping/>
+  </p:clrMapOvr>
+</p:sld>
+</file>
+
+<file path=ppt/slides/slide3.xml><?xml version="1.0" encoding="utf-8"?>
+<p:sld xmlns:a="http://schemas.openxmlformats.org/drawingml/2006/main" xmlns:r="http://schemas.openxmlformats.org/officeDocument/2006/relationships" xmlns:p="http://schemas.openxmlformats.org/presentationml/2006/main">
+  <p:cSld>
+    <p:spTree>
+      <p:nvGrpSpPr>
+        <p:cNvPr id="1" name=""/>
+        <p:cNvGrpSpPr/>
+        <p:nvPr/>
+      </p:nvGrpSpPr>
+      <p:grpSpPr>
+        <a:xfrm>
+          <a:off x="0" y="0"/>
+          <a:ext cx="0" cy="0"/>
+          <a:chOff x="0" y="0"/>
+          <a:chExt cx="0" cy="0"/>
+        </a:xfrm>
+      </p:grpSpPr>
+      <p:sp>
+        <p:nvSpPr>
+          <p:cNvPr id="2" name="CuadroTexto 1">
+            <a:extLst>
+              <a:ext uri="{FF2B5EF4-FFF2-40B4-BE49-F238E27FC236}">
+                <a16:creationId xmlns:a16="http://schemas.microsoft.com/office/drawing/2014/main" id="{1B2AB759-B7BE-1023-A82B-F7B9393B8EED}"/>
+              </a:ext>
+            </a:extLst>
+          </p:cNvPr>
+          <p:cNvSpPr txBox="1"/>
+          <p:nvPr/>
+        </p:nvSpPr>
+        <p:spPr>
+          <a:xfrm>
+            <a:off x="1524000" y="1224951"/>
+            <a:ext cx="9374038" cy="4062651"/>
+          </a:xfrm>
+          <a:prstGeom prst="rect">
+            <a:avLst/>
+          </a:prstGeom>
+          <a:noFill/>
+        </p:spPr>
+        <p:txBody>
+          <a:bodyPr wrap="square" rtlCol="0">
+            <a:spAutoFit/>
+          </a:bodyPr>
+          <a:lstStyle/>
+          <a:p>
+            <a:pPr algn="just"/>
+            <a:r>
+              <a:rPr lang="es-ES" sz="2400" dirty="0"/>
+              <a:t>Italia dependió del gas ruso durante dos décadas de manera estable y económica. Sin embargo, entre 2021 y 2022, la situación cambió debido a:</a:t>
+            </a:r>
+          </a:p>
+          <a:p>
+            <a:pPr algn="just"/>
+            <a:endParaRPr lang="es-ES" sz="2400" dirty="0"/>
+          </a:p>
+          <a:p>
+            <a:pPr algn="just">
+              <a:buFont typeface="Arial" panose="020B0604020202020204" pitchFamily="34" charset="0"/>
+              <a:buChar char="•"/>
+            </a:pPr>
+            <a:r>
+              <a:rPr lang="es-ES" sz="2400" u="sng" dirty="0"/>
+              <a:t>Interrupciones en cadenas de suministro (pandemia y tensiones globales).</a:t>
+            </a:r>
+          </a:p>
+          <a:p>
+            <a:pPr algn="just">
+              <a:buFont typeface="Arial" panose="020B0604020202020204" pitchFamily="34" charset="0"/>
+              <a:buChar char="•"/>
+            </a:pPr>
+            <a:endParaRPr lang="es-ES" sz="2400" dirty="0"/>
+          </a:p>
+          <a:p>
+            <a:pPr algn="just">
+              <a:buFont typeface="Arial" panose="020B0604020202020204" pitchFamily="34" charset="0"/>
+              <a:buChar char="•"/>
+            </a:pPr>
+            <a:r>
+              <a:rPr lang="es-ES" sz="2400" u="sng" dirty="0"/>
+              <a:t>Políticas que impulsan energías renovables</a:t>
+            </a:r>
+            <a:r>
+              <a:rPr lang="es-ES" sz="2400" b="1" dirty="0"/>
+              <a:t>.</a:t>
+            </a:r>
+          </a:p>
+          <a:p>
+            <a:pPr algn="just">
+              <a:buFont typeface="Arial" panose="020B0604020202020204" pitchFamily="34" charset="0"/>
+              <a:buChar char="•"/>
+            </a:pPr>
+            <a:endParaRPr lang="es-ES" sz="2400" dirty="0"/>
+          </a:p>
+          <a:p>
+            <a:pPr algn="just">
+              <a:buFont typeface="Arial" panose="020B0604020202020204" pitchFamily="34" charset="0"/>
+              <a:buChar char="•"/>
+            </a:pPr>
+            <a:r>
+              <a:rPr lang="es-ES" sz="2400" u="sng" dirty="0"/>
+              <a:t>Conflictos geopolíticos como la guerra en Ucrania, que elevaron los costos energéticos</a:t>
+            </a:r>
+            <a:r>
+              <a:rPr lang="es-ES" sz="2400" dirty="0"/>
+              <a:t>.</a:t>
+            </a:r>
+          </a:p>
+          <a:p>
+            <a:endParaRPr lang="es-ES" dirty="0"/>
+          </a:p>
+        </p:txBody>
+      </p:sp>
+    </p:spTree>
+    <p:extLst>
+      <p:ext uri="{BB962C8B-B14F-4D97-AF65-F5344CB8AC3E}">
+        <p14:creationId xmlns:p14="http://schemas.microsoft.com/office/powerpoint/2010/main" val="4129617856"/>
+      </p:ext>
+    </p:extLst>
+  </p:cSld>
+  <p:clrMapOvr>
+    <a:masterClrMapping/>
+  </p:clrMapOvr>
+</p:sld>
+</file>
+
+<file path=ppt/slides/slide4.xml><?xml version="1.0" encoding="utf-8"?>
+<p:sld xmlns:a="http://schemas.openxmlformats.org/drawingml/2006/main" xmlns:r="http://schemas.openxmlformats.org/officeDocument/2006/relationships" xmlns:p="http://schemas.openxmlformats.org/presentationml/2006/main">
+  <p:cSld>
+    <p:spTree>
+      <p:nvGrpSpPr>
+        <p:cNvPr id="1" name=""/>
+        <p:cNvGrpSpPr/>
+        <p:nvPr/>
+      </p:nvGrpSpPr>
+      <p:grpSpPr>
+        <a:xfrm>
+          <a:off x="0" y="0"/>
+          <a:ext cx="0" cy="0"/>
+          <a:chOff x="0" y="0"/>
+          <a:chExt cx="0" cy="0"/>
+        </a:xfrm>
+      </p:grpSpPr>
+      <p:pic>
+        <p:nvPicPr>
+          <p:cNvPr id="4" name="Imagen 3" descr="Gráfico, Gráfico de líneas&#10;&#10;Descripción generada automáticamente">
+            <a:extLst>
+              <a:ext uri="{FF2B5EF4-FFF2-40B4-BE49-F238E27FC236}">
+                <a16:creationId xmlns:a16="http://schemas.microsoft.com/office/drawing/2014/main" id="{894F9F1D-9A60-9A56-F2E3-9B6F077EF48E}"/>
+              </a:ext>
+            </a:extLst>
+          </p:cNvPr>
+          <p:cNvPicPr>
+            <a:picLocks noChangeAspect="1"/>
+          </p:cNvPicPr>
+          <p:nvPr/>
+        </p:nvPicPr>
+        <p:blipFill>
+          <a:blip r:embed="rId2"/>
+          <a:stretch>
+            <a:fillRect/>
+          </a:stretch>
+        </p:blipFill>
+        <p:spPr>
+          <a:xfrm>
+            <a:off x="1598762" y="817092"/>
+            <a:ext cx="8137585" cy="4187298"/>
+          </a:xfrm>
+          <a:prstGeom prst="rect">
+            <a:avLst/>
+          </a:prstGeom>
+        </p:spPr>
+      </p:pic>
+      <p:sp>
+        <p:nvSpPr>
+          <p:cNvPr id="6" name="CuadroTexto 5">
+            <a:extLst>
+              <a:ext uri="{FF2B5EF4-FFF2-40B4-BE49-F238E27FC236}">
+                <a16:creationId xmlns:a16="http://schemas.microsoft.com/office/drawing/2014/main" id="{F87A93BB-6531-B4E0-0441-C9F260CB78B9}"/>
+              </a:ext>
+            </a:extLst>
+          </p:cNvPr>
+          <p:cNvSpPr txBox="1"/>
+          <p:nvPr/>
+        </p:nvSpPr>
+        <p:spPr>
+          <a:xfrm>
+            <a:off x="2030082" y="126520"/>
+            <a:ext cx="8672423" cy="738664"/>
+          </a:xfrm>
+          <a:prstGeom prst="rect">
+            <a:avLst/>
+          </a:prstGeom>
+          <a:noFill/>
+        </p:spPr>
+        <p:txBody>
+          <a:bodyPr wrap="square" rtlCol="0">
+            <a:spAutoFit/>
+          </a:bodyPr>
+          <a:lstStyle/>
+          <a:p>
+            <a:pPr algn="just"/>
+            <a:r>
+              <a:rPr lang="es-ES" sz="2400" b="1" dirty="0"/>
+              <a:t>Resumen del Análisis de Precios de Electricidad (2012-2021)</a:t>
+            </a:r>
+          </a:p>
+          <a:p>
+            <a:endParaRPr lang="es-ES" dirty="0"/>
+          </a:p>
+        </p:txBody>
+      </p:sp>
+      <p:sp>
+        <p:nvSpPr>
+          <p:cNvPr id="7" name="CuadroTexto 6">
+            <a:extLst>
+              <a:ext uri="{FF2B5EF4-FFF2-40B4-BE49-F238E27FC236}">
+                <a16:creationId xmlns:a16="http://schemas.microsoft.com/office/drawing/2014/main" id="{ED433D01-264D-B03D-1DA9-29452F5F5D3F}"/>
+              </a:ext>
+            </a:extLst>
+          </p:cNvPr>
+          <p:cNvSpPr txBox="1"/>
+          <p:nvPr/>
+        </p:nvSpPr>
+        <p:spPr>
+          <a:xfrm>
+            <a:off x="1477992" y="5250611"/>
+            <a:ext cx="9684589" cy="1200329"/>
+          </a:xfrm>
+          <a:prstGeom prst="rect">
+            <a:avLst/>
+          </a:prstGeom>
+          <a:noFill/>
+        </p:spPr>
+        <p:txBody>
+          <a:bodyPr wrap="square" rtlCol="0">
+            <a:spAutoFit/>
+          </a:bodyPr>
+          <a:lstStyle/>
+          <a:p>
+            <a:r>
+              <a:rPr lang="es-ES" dirty="0"/>
+              <a:t>Sicilia es consistentemente la zona con los precios más altos y presenta la mayor diferencia respecto al precio único nacional, mientras que el sur (Sud) es la más económica. Las estaciones, meses, y horas específicas impactan significativamente los costos energéticos.</a:t>
+            </a:r>
+          </a:p>
+          <a:p>
+            <a:endParaRPr lang="es-ES" dirty="0"/>
+          </a:p>
+        </p:txBody>
+      </p:sp>
+      <p:sp>
+        <p:nvSpPr>
+          <p:cNvPr id="8" name="CuadroTexto 7">
+            <a:extLst>
+              <a:ext uri="{FF2B5EF4-FFF2-40B4-BE49-F238E27FC236}">
+                <a16:creationId xmlns:a16="http://schemas.microsoft.com/office/drawing/2014/main" id="{2AA63098-4F7D-D5A0-232F-6673CA41F474}"/>
+              </a:ext>
+            </a:extLst>
+          </p:cNvPr>
+          <p:cNvSpPr txBox="1"/>
+          <p:nvPr/>
+        </p:nvSpPr>
+        <p:spPr>
+          <a:xfrm>
+            <a:off x="9931879" y="1334219"/>
+            <a:ext cx="1702279" cy="3539430"/>
+          </a:xfrm>
+          <a:prstGeom prst="rect">
+            <a:avLst/>
+          </a:prstGeom>
+          <a:noFill/>
+        </p:spPr>
+        <p:txBody>
+          <a:bodyPr wrap="square" rtlCol="0">
+            <a:spAutoFit/>
+          </a:bodyPr>
+          <a:lstStyle/>
+          <a:p>
+            <a:r>
+              <a:rPr lang="es-ES" sz="1200" b="1" dirty="0"/>
+              <a:t>Año con precios más altos:</a:t>
+            </a:r>
+            <a:endParaRPr lang="es-ES" sz="1200" dirty="0"/>
+          </a:p>
+          <a:p>
+            <a:pPr>
+              <a:buFont typeface="Arial" panose="020B0604020202020204" pitchFamily="34" charset="0"/>
+              <a:buChar char="•"/>
+            </a:pPr>
+            <a:r>
+              <a:rPr lang="es-ES" sz="1200" b="1" dirty="0"/>
+              <a:t>2021</a:t>
+            </a:r>
+            <a:r>
+              <a:rPr lang="es-ES" sz="1200" dirty="0"/>
+              <a:t> (excepto Sicilia, que fue en 2012).</a:t>
+            </a:r>
+          </a:p>
+          <a:p>
+            <a:r>
+              <a:rPr lang="es-ES" sz="1200" b="1" dirty="0"/>
+              <a:t>Precios máximos por zona:</a:t>
+            </a:r>
+            <a:endParaRPr lang="es-ES" sz="1200" dirty="0"/>
+          </a:p>
+          <a:p>
+            <a:pPr>
+              <a:buFont typeface="Arial" panose="020B0604020202020204" pitchFamily="34" charset="0"/>
+              <a:buChar char="•"/>
+            </a:pPr>
+            <a:r>
+              <a:rPr lang="es-ES" sz="1200" b="1" dirty="0"/>
+              <a:t>Nord:</a:t>
+            </a:r>
+            <a:r>
+              <a:rPr lang="es-ES" sz="1200" dirty="0"/>
+              <a:t> 555.00 €/</a:t>
+            </a:r>
+            <a:r>
+              <a:rPr lang="es-ES" sz="1200" dirty="0" err="1"/>
+              <a:t>MWh</a:t>
+            </a:r>
+            <a:endParaRPr lang="es-ES" sz="1200" dirty="0"/>
+          </a:p>
+          <a:p>
+            <a:pPr>
+              <a:buFont typeface="Arial" panose="020B0604020202020204" pitchFamily="34" charset="0"/>
+              <a:buChar char="•"/>
+            </a:pPr>
+            <a:r>
+              <a:rPr lang="es-ES" sz="1200" b="1" dirty="0" err="1"/>
+              <a:t>Sardinia</a:t>
+            </a:r>
+            <a:r>
+              <a:rPr lang="es-ES" sz="1200" b="1" dirty="0"/>
+              <a:t>:</a:t>
+            </a:r>
+            <a:r>
+              <a:rPr lang="es-ES" sz="1200" dirty="0"/>
+              <a:t> 533.19 €/</a:t>
+            </a:r>
+            <a:r>
+              <a:rPr lang="es-ES" sz="1200" dirty="0" err="1"/>
+              <a:t>MWh</a:t>
+            </a:r>
+            <a:endParaRPr lang="es-ES" sz="1200" dirty="0"/>
+          </a:p>
+          <a:p>
+            <a:pPr>
+              <a:buFont typeface="Arial" panose="020B0604020202020204" pitchFamily="34" charset="0"/>
+              <a:buChar char="•"/>
+            </a:pPr>
+            <a:r>
+              <a:rPr lang="es-ES" sz="1200" b="1" dirty="0" err="1"/>
+              <a:t>Sicily</a:t>
+            </a:r>
+            <a:r>
+              <a:rPr lang="es-ES" sz="1200" b="1" dirty="0"/>
+              <a:t>:</a:t>
+            </a:r>
+            <a:r>
+              <a:rPr lang="es-ES" sz="1200" dirty="0"/>
+              <a:t> 3000.00 €/</a:t>
+            </a:r>
+            <a:r>
+              <a:rPr lang="es-ES" sz="1200" dirty="0" err="1"/>
+              <a:t>MWh</a:t>
+            </a:r>
+            <a:r>
+              <a:rPr lang="es-ES" sz="1200" dirty="0"/>
+              <a:t> (2012, excepcional)</a:t>
+            </a:r>
+          </a:p>
+          <a:p>
+            <a:pPr>
+              <a:buFont typeface="Arial" panose="020B0604020202020204" pitchFamily="34" charset="0"/>
+              <a:buChar char="•"/>
+            </a:pPr>
+            <a:r>
+              <a:rPr lang="es-ES" sz="1200" b="1" dirty="0"/>
+              <a:t>Sud:</a:t>
+            </a:r>
+            <a:r>
+              <a:rPr lang="es-ES" sz="1200" dirty="0"/>
+              <a:t> 533.19 €/</a:t>
+            </a:r>
+            <a:r>
+              <a:rPr lang="es-ES" sz="1200" dirty="0" err="1"/>
+              <a:t>MWh</a:t>
+            </a:r>
+            <a:endParaRPr lang="es-ES" sz="1200" dirty="0"/>
+          </a:p>
+          <a:p>
+            <a:pPr>
+              <a:buFont typeface="Arial" panose="020B0604020202020204" pitchFamily="34" charset="0"/>
+              <a:buChar char="•"/>
+            </a:pPr>
+            <a:r>
+              <a:rPr lang="es-ES" sz="1200" b="1" dirty="0"/>
+              <a:t>Sud Center:</a:t>
+            </a:r>
+            <a:r>
+              <a:rPr lang="es-ES" sz="1200" dirty="0"/>
+              <a:t> 533.19 €/</a:t>
+            </a:r>
+            <a:r>
+              <a:rPr lang="es-ES" sz="1200" dirty="0" err="1"/>
+              <a:t>MWh</a:t>
+            </a:r>
+            <a:endParaRPr lang="es-ES" sz="1200" dirty="0"/>
+          </a:p>
+          <a:p>
+            <a:pPr>
+              <a:buFont typeface="Arial" panose="020B0604020202020204" pitchFamily="34" charset="0"/>
+              <a:buChar char="•"/>
+            </a:pPr>
+            <a:r>
+              <a:rPr lang="es-ES" sz="1200" b="1" dirty="0"/>
+              <a:t>Nord Center:</a:t>
+            </a:r>
+            <a:r>
+              <a:rPr lang="es-ES" sz="1200" dirty="0"/>
+              <a:t> 555.00 €/</a:t>
+            </a:r>
+            <a:r>
+              <a:rPr lang="es-ES" sz="1200" dirty="0" err="1"/>
+              <a:t>MWh</a:t>
+            </a:r>
+            <a:endParaRPr lang="es-ES" sz="1200" dirty="0"/>
+          </a:p>
+          <a:p>
+            <a:endParaRPr lang="es-ES" sz="2000" dirty="0"/>
+          </a:p>
+        </p:txBody>
+      </p:sp>
+    </p:spTree>
+    <p:extLst>
+      <p:ext uri="{BB962C8B-B14F-4D97-AF65-F5344CB8AC3E}">
+        <p14:creationId xmlns:p14="http://schemas.microsoft.com/office/powerpoint/2010/main" val="1978687563"/>
+      </p:ext>
+    </p:extLst>
+  </p:cSld>
+  <p:clrMapOvr>
+    <a:masterClrMapping/>
+  </p:clrMapOvr>
+</p:sld>
+</file>
+
+<file path=ppt/slides/slide5.xml><?xml version="1.0" encoding="utf-8"?>
+<p:sld xmlns:a="http://schemas.openxmlformats.org/drawingml/2006/main" xmlns:r="http://schemas.openxmlformats.org/officeDocument/2006/relationships" xmlns:p="http://schemas.openxmlformats.org/presentationml/2006/main">
+  <p:cSld>
+    <p:spTree>
+      <p:nvGrpSpPr>
+        <p:cNvPr id="1" name=""/>
+        <p:cNvGrpSpPr/>
+        <p:nvPr/>
+      </p:nvGrpSpPr>
+      <p:grpSpPr>
+        <a:xfrm>
+          <a:off x="0" y="0"/>
+          <a:ext cx="0" cy="0"/>
+          <a:chOff x="0" y="0"/>
+          <a:chExt cx="0" cy="0"/>
+        </a:xfrm>
+      </p:grpSpPr>
+      <p:sp>
+        <p:nvSpPr>
+          <p:cNvPr id="2" name="CuadroTexto 1">
+            <a:extLst>
+              <a:ext uri="{FF2B5EF4-FFF2-40B4-BE49-F238E27FC236}">
+                <a16:creationId xmlns:a16="http://schemas.microsoft.com/office/drawing/2014/main" id="{7156B102-9617-05E5-4674-8A268502A50B}"/>
+              </a:ext>
+            </a:extLst>
+          </p:cNvPr>
+          <p:cNvSpPr txBox="1"/>
+          <p:nvPr/>
+        </p:nvSpPr>
+        <p:spPr>
+          <a:xfrm>
+            <a:off x="1326245" y="4911985"/>
+            <a:ext cx="8844951" cy="646331"/>
+          </a:xfrm>
+          <a:prstGeom prst="rect">
+            <a:avLst/>
+          </a:prstGeom>
+          <a:noFill/>
+        </p:spPr>
+        <p:txBody>
+          <a:bodyPr wrap="square" rtlCol="0">
+            <a:spAutoFit/>
+          </a:bodyPr>
+          <a:lstStyle/>
+          <a:p>
+            <a:pPr lvl="1"/>
+            <a:endParaRPr lang="es-ES" dirty="0"/>
+          </a:p>
+          <a:p>
+            <a:endParaRPr lang="es-ES" dirty="0"/>
+          </a:p>
+        </p:txBody>
+      </p:sp>
+      <p:pic>
+        <p:nvPicPr>
+          <p:cNvPr id="4" name="Imagen 3" descr="Gráfico, Gráfico de líneas&#10;&#10;Descripción generada automáticamente">
+            <a:extLst>
+              <a:ext uri="{FF2B5EF4-FFF2-40B4-BE49-F238E27FC236}">
+                <a16:creationId xmlns:a16="http://schemas.microsoft.com/office/drawing/2014/main" id="{C5273301-EA7C-B834-9A76-6F7E49F2B687}"/>
+              </a:ext>
+            </a:extLst>
+          </p:cNvPr>
+          <p:cNvPicPr>
+            <a:picLocks noChangeAspect="1"/>
+          </p:cNvPicPr>
+          <p:nvPr/>
+        </p:nvPicPr>
+        <p:blipFill>
+          <a:blip r:embed="rId2"/>
+          <a:stretch>
+            <a:fillRect/>
+          </a:stretch>
+        </p:blipFill>
+        <p:spPr>
+          <a:xfrm>
+            <a:off x="1469366" y="824176"/>
+            <a:ext cx="9253268" cy="4410974"/>
+          </a:xfrm>
+          <a:prstGeom prst="rect">
+            <a:avLst/>
+          </a:prstGeom>
+        </p:spPr>
+      </p:pic>
+      <p:sp>
+        <p:nvSpPr>
+          <p:cNvPr id="5" name="CuadroTexto 4">
+            <a:extLst>
+              <a:ext uri="{FF2B5EF4-FFF2-40B4-BE49-F238E27FC236}">
+                <a16:creationId xmlns:a16="http://schemas.microsoft.com/office/drawing/2014/main" id="{EE0251E7-4553-4E74-C124-1704DF201F50}"/>
+              </a:ext>
+            </a:extLst>
+          </p:cNvPr>
+          <p:cNvSpPr txBox="1"/>
+          <p:nvPr/>
+        </p:nvSpPr>
+        <p:spPr>
+          <a:xfrm>
+            <a:off x="1396283" y="178279"/>
+            <a:ext cx="8774913" cy="738664"/>
+          </a:xfrm>
+          <a:prstGeom prst="rect">
+            <a:avLst/>
+          </a:prstGeom>
+          <a:noFill/>
+        </p:spPr>
+        <p:txBody>
+          <a:bodyPr wrap="square" rtlCol="0">
+            <a:spAutoFit/>
+          </a:bodyPr>
+          <a:lstStyle/>
+          <a:p>
+            <a:pPr algn="ctr"/>
+            <a:r>
+              <a:rPr lang="es-ES" sz="2400" b="1" dirty="0"/>
+              <a:t>Promedios por Periodo</a:t>
+            </a:r>
+          </a:p>
+          <a:p>
+            <a:endParaRPr lang="es-ES" dirty="0"/>
+          </a:p>
+        </p:txBody>
+      </p:sp>
+      <p:sp>
+        <p:nvSpPr>
+          <p:cNvPr id="6" name="CuadroTexto 5">
+            <a:extLst>
+              <a:ext uri="{FF2B5EF4-FFF2-40B4-BE49-F238E27FC236}">
+                <a16:creationId xmlns:a16="http://schemas.microsoft.com/office/drawing/2014/main" id="{9D93A0F1-89CF-F34A-8057-95398FDEFD1E}"/>
+              </a:ext>
+            </a:extLst>
+          </p:cNvPr>
+          <p:cNvSpPr txBox="1"/>
+          <p:nvPr/>
+        </p:nvSpPr>
+        <p:spPr>
+          <a:xfrm>
+            <a:off x="3358551" y="5425582"/>
+            <a:ext cx="8574656" cy="646331"/>
+          </a:xfrm>
+          <a:prstGeom prst="rect">
+            <a:avLst/>
+          </a:prstGeom>
+          <a:noFill/>
+        </p:spPr>
+        <p:txBody>
+          <a:bodyPr wrap="square" rtlCol="0">
+            <a:spAutoFit/>
+          </a:bodyPr>
+          <a:lstStyle/>
+          <a:p>
+            <a:r>
+              <a:rPr lang="es-ES" b="1" dirty="0"/>
+              <a:t>Mes con precios más altos:</a:t>
+            </a:r>
+            <a:r>
+              <a:rPr lang="es-ES" dirty="0"/>
+              <a:t> Diciembre (todas las zonas).</a:t>
+            </a:r>
+          </a:p>
+          <a:p>
+            <a:endParaRPr lang="es-ES" dirty="0"/>
+          </a:p>
+        </p:txBody>
+      </p:sp>
+      <p:sp>
+        <p:nvSpPr>
+          <p:cNvPr id="7" name="CuadroTexto 6">
+            <a:extLst>
+              <a:ext uri="{FF2B5EF4-FFF2-40B4-BE49-F238E27FC236}">
+                <a16:creationId xmlns:a16="http://schemas.microsoft.com/office/drawing/2014/main" id="{41B942C4-3535-BB9D-D1A5-DF7FB9CE62C0}"/>
+              </a:ext>
+            </a:extLst>
+          </p:cNvPr>
+          <p:cNvSpPr txBox="1"/>
+          <p:nvPr/>
+        </p:nvSpPr>
+        <p:spPr>
+          <a:xfrm>
+            <a:off x="4456982" y="5818778"/>
+            <a:ext cx="5175849" cy="369332"/>
+          </a:xfrm>
+          <a:prstGeom prst="rect">
+            <a:avLst/>
+          </a:prstGeom>
+          <a:noFill/>
+        </p:spPr>
+        <p:txBody>
+          <a:bodyPr wrap="square" rtlCol="0">
+            <a:spAutoFit/>
+          </a:bodyPr>
+          <a:lstStyle/>
+          <a:p>
+            <a:r>
+              <a:rPr lang="es-ES" b="1" dirty="0"/>
+              <a:t>Estación más cara:</a:t>
+            </a:r>
+            <a:r>
+              <a:rPr lang="es-ES" dirty="0"/>
+              <a:t> Otoño.</a:t>
+            </a:r>
+          </a:p>
+        </p:txBody>
+      </p:sp>
+    </p:spTree>
+    <p:extLst>
+      <p:ext uri="{BB962C8B-B14F-4D97-AF65-F5344CB8AC3E}">
+        <p14:creationId xmlns:p14="http://schemas.microsoft.com/office/powerpoint/2010/main" val="3768539023"/>
+      </p:ext>
+    </p:extLst>
+  </p:cSld>
+  <p:clrMapOvr>
+    <a:masterClrMapping/>
+  </p:clrMapOvr>
+</p:sld>
+</file>
+
+<file path=ppt/slides/slide6.xml><?xml version="1.0" encoding="utf-8"?>
+<p:sld xmlns:a="http://schemas.openxmlformats.org/drawingml/2006/main" xmlns:r="http://schemas.openxmlformats.org/officeDocument/2006/relationships" xmlns:p="http://schemas.openxmlformats.org/presentationml/2006/main">
+  <p:cSld>
+    <p:spTree>
+      <p:nvGrpSpPr>
+        <p:cNvPr id="1" name=""/>
+        <p:cNvGrpSpPr/>
+        <p:nvPr/>
+      </p:nvGrpSpPr>
+      <p:grpSpPr>
+        <a:xfrm>
+          <a:off x="0" y="0"/>
+          <a:ext cx="0" cy="0"/>
+          <a:chOff x="0" y="0"/>
+          <a:chExt cx="0" cy="0"/>
+        </a:xfrm>
+      </p:grpSpPr>
+      <p:sp>
+        <p:nvSpPr>
+          <p:cNvPr id="2" name="CuadroTexto 1">
+            <a:extLst>
+              <a:ext uri="{FF2B5EF4-FFF2-40B4-BE49-F238E27FC236}">
+                <a16:creationId xmlns:a16="http://schemas.microsoft.com/office/drawing/2014/main" id="{EBE3B0BB-5EB2-A4B3-CC8A-FF2F0DD7A63C}"/>
+              </a:ext>
+            </a:extLst>
+          </p:cNvPr>
+          <p:cNvSpPr txBox="1"/>
+          <p:nvPr/>
+        </p:nvSpPr>
+        <p:spPr>
+          <a:xfrm>
+            <a:off x="4094672" y="5994246"/>
+            <a:ext cx="8626415" cy="646331"/>
+          </a:xfrm>
+          <a:prstGeom prst="rect">
+            <a:avLst/>
+          </a:prstGeom>
+          <a:noFill/>
+        </p:spPr>
+        <p:txBody>
+          <a:bodyPr wrap="square" rtlCol="0">
+            <a:spAutoFit/>
+          </a:bodyPr>
+          <a:lstStyle/>
+          <a:p>
+            <a:r>
+              <a:rPr lang="es-ES" b="1" dirty="0"/>
+              <a:t>Hora más cara:</a:t>
+            </a:r>
+            <a:r>
+              <a:rPr lang="es-ES" dirty="0"/>
+              <a:t> Tarde/Noche (</a:t>
+            </a:r>
+            <a:r>
+              <a:rPr lang="es-ES" dirty="0" err="1"/>
+              <a:t>Evening</a:t>
+            </a:r>
+            <a:r>
+              <a:rPr lang="es-ES" dirty="0"/>
+              <a:t>).</a:t>
+            </a:r>
+            <a:endParaRPr lang="es-ES" b="1" dirty="0"/>
+          </a:p>
+          <a:p>
+            <a:endParaRPr lang="es-ES" dirty="0"/>
+          </a:p>
+        </p:txBody>
+      </p:sp>
+      <p:pic>
+        <p:nvPicPr>
+          <p:cNvPr id="6" name="Imagen 5" descr="Gráfico, Gráfico de líneas&#10;&#10;Descripción generada automáticamente">
+            <a:extLst>
+              <a:ext uri="{FF2B5EF4-FFF2-40B4-BE49-F238E27FC236}">
+                <a16:creationId xmlns:a16="http://schemas.microsoft.com/office/drawing/2014/main" id="{310ACB32-0425-2412-DF37-9E68FFB0028D}"/>
+              </a:ext>
+            </a:extLst>
+          </p:cNvPr>
+          <p:cNvPicPr>
+            <a:picLocks noChangeAspect="1"/>
+          </p:cNvPicPr>
+          <p:nvPr/>
+        </p:nvPicPr>
+        <p:blipFill>
+          <a:blip r:embed="rId2"/>
+          <a:stretch>
+            <a:fillRect/>
+          </a:stretch>
+        </p:blipFill>
+        <p:spPr>
+          <a:xfrm>
+            <a:off x="1299714" y="805132"/>
+            <a:ext cx="9609826" cy="4924570"/>
+          </a:xfrm>
+          <a:prstGeom prst="rect">
+            <a:avLst/>
+          </a:prstGeom>
+        </p:spPr>
+      </p:pic>
+      <p:sp>
+        <p:nvSpPr>
+          <p:cNvPr id="7" name="CuadroTexto 6">
+            <a:extLst>
+              <a:ext uri="{FF2B5EF4-FFF2-40B4-BE49-F238E27FC236}">
+                <a16:creationId xmlns:a16="http://schemas.microsoft.com/office/drawing/2014/main" id="{16E87F18-6A0A-B888-D684-0F4995A2D289}"/>
+              </a:ext>
+            </a:extLst>
+          </p:cNvPr>
+          <p:cNvSpPr txBox="1"/>
+          <p:nvPr/>
+        </p:nvSpPr>
+        <p:spPr>
+          <a:xfrm>
+            <a:off x="4278701" y="150477"/>
+            <a:ext cx="6820619" cy="738664"/>
+          </a:xfrm>
+          <a:prstGeom prst="rect">
+            <a:avLst/>
+          </a:prstGeom>
+          <a:noFill/>
+        </p:spPr>
+        <p:txBody>
+          <a:bodyPr wrap="square" rtlCol="0">
+            <a:spAutoFit/>
+          </a:bodyPr>
+          <a:lstStyle/>
+          <a:p>
+            <a:r>
+              <a:rPr lang="es-ES" sz="2400" b="1" dirty="0"/>
+              <a:t>Promedios por Periodo</a:t>
+            </a:r>
+          </a:p>
+          <a:p>
+            <a:endParaRPr lang="es-ES" dirty="0"/>
+          </a:p>
+        </p:txBody>
+      </p:sp>
+    </p:spTree>
+    <p:extLst>
+      <p:ext uri="{BB962C8B-B14F-4D97-AF65-F5344CB8AC3E}">
+        <p14:creationId xmlns:p14="http://schemas.microsoft.com/office/powerpoint/2010/main" val="3244424133"/>
+      </p:ext>
+    </p:extLst>
+  </p:cSld>
+  <p:clrMapOvr>
+    <a:masterClrMapping/>
+  </p:clrMapOvr>
+</p:sld>
+</file>
+
+<file path=ppt/slides/slide7.xml><?xml version="1.0" encoding="utf-8"?>
+<p:sld xmlns:a="http://schemas.openxmlformats.org/drawingml/2006/main" xmlns:r="http://schemas.openxmlformats.org/officeDocument/2006/relationships" xmlns:p="http://schemas.openxmlformats.org/presentationml/2006/main">
+  <p:cSld>
+    <p:spTree>
+      <p:nvGrpSpPr>
+        <p:cNvPr id="1" name=""/>
+        <p:cNvGrpSpPr/>
+        <p:nvPr/>
+      </p:nvGrpSpPr>
+      <p:grpSpPr>
+        <a:xfrm>
+          <a:off x="0" y="0"/>
+          <a:ext cx="0" cy="0"/>
+          <a:chOff x="0" y="0"/>
+          <a:chExt cx="0" cy="0"/>
+        </a:xfrm>
+      </p:grpSpPr>
+      <p:sp>
+        <p:nvSpPr>
+          <p:cNvPr id="3" name="CuadroTexto 2">
+            <a:extLst>
+              <a:ext uri="{FF2B5EF4-FFF2-40B4-BE49-F238E27FC236}">
+                <a16:creationId xmlns:a16="http://schemas.microsoft.com/office/drawing/2014/main" id="{B3B1CA62-DBB8-1910-7CB0-641A58204914}"/>
+              </a:ext>
+            </a:extLst>
+          </p:cNvPr>
+          <p:cNvSpPr txBox="1"/>
+          <p:nvPr/>
+        </p:nvSpPr>
+        <p:spPr>
+          <a:xfrm>
+            <a:off x="2935857" y="1242060"/>
+            <a:ext cx="6101750" cy="3785652"/>
+          </a:xfrm>
+          <a:prstGeom prst="rect">
+            <a:avLst/>
+          </a:prstGeom>
+          <a:noFill/>
+        </p:spPr>
+        <p:txBody>
+          <a:bodyPr wrap="square">
+            <a:spAutoFit/>
+          </a:bodyPr>
+          <a:lstStyle/>
+          <a:p>
+            <a:r>
+              <a:rPr lang="es-ES" sz="2400" b="1" dirty="0"/>
+              <a:t>Zona más cara:</a:t>
+            </a:r>
+            <a:r>
+              <a:rPr lang="es-ES" sz="2400" dirty="0"/>
+              <a:t> Sicilia (</a:t>
+            </a:r>
+            <a:r>
+              <a:rPr lang="es-ES" sz="2400" b="1" dirty="0"/>
+              <a:t>74.15 €/</a:t>
+            </a:r>
+            <a:r>
+              <a:rPr lang="es-ES" sz="2400" b="1" dirty="0" err="1"/>
+              <a:t>MWh</a:t>
+            </a:r>
+            <a:r>
+              <a:rPr lang="es-ES" sz="2400" dirty="0"/>
+              <a:t>).</a:t>
+            </a:r>
+          </a:p>
+          <a:p>
+            <a:endParaRPr lang="es-ES" sz="2400" dirty="0"/>
+          </a:p>
+          <a:p>
+            <a:r>
+              <a:rPr lang="es-ES" sz="2400" b="1" dirty="0"/>
+              <a:t>Zona más barata:</a:t>
+            </a:r>
+            <a:r>
+              <a:rPr lang="es-ES" sz="2400" dirty="0"/>
+              <a:t> Sud (</a:t>
+            </a:r>
+            <a:r>
+              <a:rPr lang="es-ES" sz="2400" b="1" dirty="0"/>
+              <a:t>58.73 €/</a:t>
+            </a:r>
+            <a:r>
+              <a:rPr lang="es-ES" sz="2400" b="1" dirty="0" err="1"/>
+              <a:t>MWh</a:t>
+            </a:r>
+            <a:r>
+              <a:rPr lang="es-ES" sz="2400" dirty="0"/>
+              <a:t>).</a:t>
+            </a:r>
+          </a:p>
+          <a:p>
+            <a:endParaRPr lang="es-ES" sz="2400" dirty="0"/>
+          </a:p>
+          <a:p>
+            <a:r>
+              <a:rPr lang="es-ES" sz="2400" b="1" dirty="0"/>
+              <a:t>Precio único nacional:</a:t>
+            </a:r>
+            <a:r>
+              <a:rPr lang="es-ES" sz="2400" dirty="0"/>
+              <a:t> </a:t>
+            </a:r>
+            <a:r>
+              <a:rPr lang="es-ES" sz="2400" b="1" dirty="0"/>
+              <a:t>61.75 €/</a:t>
+            </a:r>
+            <a:r>
+              <a:rPr lang="es-ES" sz="2400" b="1" dirty="0" err="1"/>
+              <a:t>MWh</a:t>
+            </a:r>
+            <a:r>
+              <a:rPr lang="es-ES" sz="2400" dirty="0"/>
+              <a:t>.</a:t>
+            </a:r>
+          </a:p>
+          <a:p>
+            <a:endParaRPr lang="es-ES" sz="2400" dirty="0"/>
+          </a:p>
+          <a:p>
+            <a:r>
+              <a:rPr lang="es-ES" sz="2400" b="1" dirty="0"/>
+              <a:t>Diferencia entre Precios Nacionales y Zonales</a:t>
+            </a:r>
+          </a:p>
+          <a:p>
+            <a:endParaRPr lang="es-ES" sz="2400" b="1" dirty="0"/>
+          </a:p>
+          <a:p>
+            <a:r>
+              <a:rPr lang="es-ES" sz="2400" b="1" dirty="0"/>
+              <a:t>Mayor diferencia:</a:t>
+            </a:r>
+            <a:r>
+              <a:rPr lang="es-ES" sz="2400" dirty="0"/>
+              <a:t> Sicilia → </a:t>
+            </a:r>
+            <a:r>
+              <a:rPr lang="es-ES" sz="2400" b="1" dirty="0"/>
+              <a:t>+12.40 €/</a:t>
+            </a:r>
+            <a:r>
+              <a:rPr lang="es-ES" sz="2400" b="1" dirty="0" err="1"/>
+              <a:t>MWh</a:t>
+            </a:r>
+            <a:r>
+              <a:rPr lang="es-ES" sz="2400" dirty="0"/>
+              <a:t> sobre el precio nacional.</a:t>
+            </a:r>
+          </a:p>
+        </p:txBody>
+      </p:sp>
+    </p:spTree>
+    <p:extLst>
+      <p:ext uri="{BB962C8B-B14F-4D97-AF65-F5344CB8AC3E}">
+        <p14:creationId xmlns:p14="http://schemas.microsoft.com/office/powerpoint/2010/main" val="2244274602"/>
       </p:ext>
     </p:extLst>
   </p:cSld>

</xml_diff>